<commit_message>
test image in readme
</commit_message>
<xml_diff>
--- a/Resources/Explanation.pptx
+++ b/Resources/Explanation.pptx
@@ -121,7 +121,7 @@
   <p:extLst>
     <p:ext uri="{EFAFB233-063F-42B5-8137-9DF3F51BA10A}">
       <p15:sldGuideLst xmlns:p15="http://schemas.microsoft.com/office/powerpoint/2012/main">
-        <p15:guide id="1" pos="480" userDrawn="1">
+        <p15:guide id="1" pos="456" userDrawn="1">
           <p15:clr>
             <a:srgbClr val="A4A3A4"/>
           </p15:clr>
@@ -4459,30 +4459,17 @@
                   <a:schemeClr val="tx1"/>
                 </a:solidFill>
               </a:rPr>
-              <a:t>Across </a:t>
-            </a:r>
-            <a:r>
-              <a:rPr lang="en-US">
-                <a:solidFill>
-                  <a:schemeClr val="tx1"/>
-                </a:solidFill>
-              </a:rPr>
-              <a:t>full month</a:t>
-            </a:r>
-            <a:endParaRPr lang="en-US" dirty="0">
-              <a:solidFill>
-                <a:schemeClr val="tx1"/>
-              </a:solidFill>
-            </a:endParaRPr>
+              <a:t>Across full month</a:t>
+            </a:r>
           </a:p>
         </p:txBody>
       </p:sp>
       <p:pic>
         <p:nvPicPr>
-          <p:cNvPr id="6" name="Picture 5">
-            <a:extLst>
-              <a:ext uri="{FF2B5EF4-FFF2-40B4-BE49-F238E27FC236}">
-                <a16:creationId xmlns:a16="http://schemas.microsoft.com/office/drawing/2014/main" id="{F76EC63E-3DD0-5465-4C3E-3A92BC3C6122}"/>
+          <p:cNvPr id="10" name="Picture 9">
+            <a:extLst>
+              <a:ext uri="{FF2B5EF4-FFF2-40B4-BE49-F238E27FC236}">
+                <a16:creationId xmlns:a16="http://schemas.microsoft.com/office/drawing/2014/main" id="{B8A422F1-4CC2-8BB4-A528-95EF6BF98518}"/>
               </a:ext>
             </a:extLst>
           </p:cNvPr>
@@ -4500,7 +4487,7 @@
         <p:spPr>
           <a:xfrm>
             <a:off x="1108172" y="1815517"/>
-            <a:ext cx="9148529" cy="4574265"/>
+            <a:ext cx="9144000" cy="4572000"/>
           </a:xfrm>
           <a:prstGeom prst="rect">
             <a:avLst/>

</xml_diff>